<commit_message>
Quasi finale manca solo la registrazione delle anomalie in caricamento e la gestione degli amendment
</commit_message>
<xml_diff>
--- a/simulazione_egeos_case_study/progressione.pptx
+++ b/simulazione_egeos_case_study/progressione.pptx
@@ -8,6 +8,7 @@
     <p:sldId id="256" r:id="rId2"/>
     <p:sldId id="257" r:id="rId3"/>
     <p:sldId id="258" r:id="rId4"/>
+    <p:sldId id="259" r:id="rId5"/>
   </p:sldIdLst>
   <p:sldSz cx="12192000" cy="6858000"/>
   <p:notesSz cx="6858000" cy="9144000"/>
@@ -106,6 +107,11 @@
       </a:defRPr>
     </a:lvl9pPr>
   </p:defaultTextStyle>
+  <p:extLst>
+    <p:ext uri="{EFAFB233-063F-42B5-8137-9DF3F51BA10A}">
+      <p15:sldGuideLst xmlns:p15="http://schemas.microsoft.com/office/powerpoint/2012/main"/>
+    </p:ext>
+  </p:extLst>
 </p:presentation>
 </file>
 
@@ -240,7 +246,7 @@
           <a:p>
             <a:fld id="{ED547CC8-0BFB-468B-B2A5-BA6D23975E31}" type="datetimeFigureOut">
               <a:rPr lang="en-US" smtClean="0"/>
-              <a:t>3/1/2018</a:t>
+              <a:t>3/15/2018</a:t>
             </a:fld>
             <a:endParaRPr lang="en-US"/>
           </a:p>
@@ -410,7 +416,7 @@
           <a:p>
             <a:fld id="{ED547CC8-0BFB-468B-B2A5-BA6D23975E31}" type="datetimeFigureOut">
               <a:rPr lang="en-US" smtClean="0"/>
-              <a:t>3/1/2018</a:t>
+              <a:t>3/15/2018</a:t>
             </a:fld>
             <a:endParaRPr lang="en-US"/>
           </a:p>
@@ -590,7 +596,7 @@
           <a:p>
             <a:fld id="{ED547CC8-0BFB-468B-B2A5-BA6D23975E31}" type="datetimeFigureOut">
               <a:rPr lang="en-US" smtClean="0"/>
-              <a:t>3/1/2018</a:t>
+              <a:t>3/15/2018</a:t>
             </a:fld>
             <a:endParaRPr lang="en-US"/>
           </a:p>
@@ -760,7 +766,7 @@
           <a:p>
             <a:fld id="{ED547CC8-0BFB-468B-B2A5-BA6D23975E31}" type="datetimeFigureOut">
               <a:rPr lang="en-US" smtClean="0"/>
-              <a:t>3/1/2018</a:t>
+              <a:t>3/15/2018</a:t>
             </a:fld>
             <a:endParaRPr lang="en-US"/>
           </a:p>
@@ -1006,7 +1012,7 @@
           <a:p>
             <a:fld id="{ED547CC8-0BFB-468B-B2A5-BA6D23975E31}" type="datetimeFigureOut">
               <a:rPr lang="en-US" smtClean="0"/>
-              <a:t>3/1/2018</a:t>
+              <a:t>3/15/2018</a:t>
             </a:fld>
             <a:endParaRPr lang="en-US"/>
           </a:p>
@@ -1238,7 +1244,7 @@
           <a:p>
             <a:fld id="{ED547CC8-0BFB-468B-B2A5-BA6D23975E31}" type="datetimeFigureOut">
               <a:rPr lang="en-US" smtClean="0"/>
-              <a:t>3/1/2018</a:t>
+              <a:t>3/15/2018</a:t>
             </a:fld>
             <a:endParaRPr lang="en-US"/>
           </a:p>
@@ -1605,7 +1611,7 @@
           <a:p>
             <a:fld id="{ED547CC8-0BFB-468B-B2A5-BA6D23975E31}" type="datetimeFigureOut">
               <a:rPr lang="en-US" smtClean="0"/>
-              <a:t>3/1/2018</a:t>
+              <a:t>3/15/2018</a:t>
             </a:fld>
             <a:endParaRPr lang="en-US"/>
           </a:p>
@@ -1723,7 +1729,7 @@
           <a:p>
             <a:fld id="{ED547CC8-0BFB-468B-B2A5-BA6D23975E31}" type="datetimeFigureOut">
               <a:rPr lang="en-US" smtClean="0"/>
-              <a:t>3/1/2018</a:t>
+              <a:t>3/15/2018</a:t>
             </a:fld>
             <a:endParaRPr lang="en-US"/>
           </a:p>
@@ -1818,7 +1824,7 @@
           <a:p>
             <a:fld id="{ED547CC8-0BFB-468B-B2A5-BA6D23975E31}" type="datetimeFigureOut">
               <a:rPr lang="en-US" smtClean="0"/>
-              <a:t>3/1/2018</a:t>
+              <a:t>3/15/2018</a:t>
             </a:fld>
             <a:endParaRPr lang="en-US"/>
           </a:p>
@@ -2095,7 +2101,7 @@
           <a:p>
             <a:fld id="{ED547CC8-0BFB-468B-B2A5-BA6D23975E31}" type="datetimeFigureOut">
               <a:rPr lang="en-US" smtClean="0"/>
-              <a:t>3/1/2018</a:t>
+              <a:t>3/15/2018</a:t>
             </a:fld>
             <a:endParaRPr lang="en-US"/>
           </a:p>
@@ -2348,7 +2354,7 @@
           <a:p>
             <a:fld id="{ED547CC8-0BFB-468B-B2A5-BA6D23975E31}" type="datetimeFigureOut">
               <a:rPr lang="en-US" smtClean="0"/>
-              <a:t>3/1/2018</a:t>
+              <a:t>3/15/2018</a:t>
             </a:fld>
             <a:endParaRPr lang="en-US"/>
           </a:p>
@@ -2561,7 +2567,7 @@
           <a:p>
             <a:fld id="{ED547CC8-0BFB-468B-B2A5-BA6D23975E31}" type="datetimeFigureOut">
               <a:rPr lang="en-US" smtClean="0"/>
-              <a:t>3/1/2018</a:t>
+              <a:t>3/15/2018</a:t>
             </a:fld>
             <a:endParaRPr lang="en-US"/>
           </a:p>
@@ -3129,6 +3135,59 @@
 </p:sld>
 </file>
 
+<file path=ppt/slides/slide4.xml><?xml version="1.0" encoding="utf-8"?>
+<p:sld xmlns:a="http://schemas.openxmlformats.org/drawingml/2006/main" xmlns:r="http://schemas.openxmlformats.org/officeDocument/2006/relationships" xmlns:p="http://schemas.openxmlformats.org/presentationml/2006/main">
+  <p:cSld>
+    <p:spTree>
+      <p:nvGrpSpPr>
+        <p:cNvPr id="1" name=""/>
+        <p:cNvGrpSpPr/>
+        <p:nvPr/>
+      </p:nvGrpSpPr>
+      <p:grpSpPr>
+        <a:xfrm>
+          <a:off x="0" y="0"/>
+          <a:ext cx="0" cy="0"/>
+          <a:chOff x="0" y="0"/>
+          <a:chExt cx="0" cy="0"/>
+        </a:xfrm>
+      </p:grpSpPr>
+      <p:pic>
+        <p:nvPicPr>
+          <p:cNvPr id="4" name="Picture 3"/>
+          <p:cNvPicPr>
+            <a:picLocks noChangeAspect="1"/>
+          </p:cNvPicPr>
+          <p:nvPr/>
+        </p:nvPicPr>
+        <p:blipFill rotWithShape="1">
+          <a:blip r:embed="rId2"/>
+          <a:srcRect l="11309" t="16286" r="57351" b="19143"/>
+          <a:stretch/>
+        </p:blipFill>
+        <p:spPr>
+          <a:xfrm>
+            <a:off x="881743" y="0"/>
+            <a:ext cx="10613571" cy="6833809"/>
+          </a:xfrm>
+          <a:prstGeom prst="rect">
+            <a:avLst/>
+          </a:prstGeom>
+        </p:spPr>
+      </p:pic>
+    </p:spTree>
+    <p:extLst>
+      <p:ext uri="{BB962C8B-B14F-4D97-AF65-F5344CB8AC3E}">
+        <p14:creationId xmlns:p14="http://schemas.microsoft.com/office/powerpoint/2010/main" val="294306453"/>
+      </p:ext>
+    </p:extLst>
+  </p:cSld>
+  <p:clrMapOvr>
+    <a:masterClrMapping/>
+  </p:clrMapOvr>
+</p:sld>
+</file>
+
 <file path=ppt/theme/theme1.xml><?xml version="1.0" encoding="utf-8"?>
 <a:theme xmlns:a="http://schemas.openxmlformats.org/drawingml/2006/main" name="Office Theme">
   <a:themeElements>

</xml_diff>

<commit_message>
used still missing update anomalies
</commit_message>
<xml_diff>
--- a/simulazione_egeos_case_study/progressione.pptx
+++ b/simulazione_egeos_case_study/progressione.pptx
@@ -5,10 +5,11 @@
     <p:sldMasterId id="2147483648" r:id="rId1"/>
   </p:sldMasterIdLst>
   <p:sldIdLst>
-    <p:sldId id="256" r:id="rId2"/>
-    <p:sldId id="257" r:id="rId3"/>
-    <p:sldId id="258" r:id="rId4"/>
-    <p:sldId id="259" r:id="rId5"/>
+    <p:sldId id="260" r:id="rId2"/>
+    <p:sldId id="256" r:id="rId3"/>
+    <p:sldId id="257" r:id="rId4"/>
+    <p:sldId id="258" r:id="rId5"/>
+    <p:sldId id="259" r:id="rId6"/>
   </p:sldIdLst>
   <p:sldSz cx="12192000" cy="6858000"/>
   <p:notesSz cx="6858000" cy="9144000"/>
@@ -246,7 +247,7 @@
           <a:p>
             <a:fld id="{ED547CC8-0BFB-468B-B2A5-BA6D23975E31}" type="datetimeFigureOut">
               <a:rPr lang="en-US" smtClean="0"/>
-              <a:t>3/15/2018</a:t>
+              <a:t>3/16/2018</a:t>
             </a:fld>
             <a:endParaRPr lang="en-US"/>
           </a:p>
@@ -416,7 +417,7 @@
           <a:p>
             <a:fld id="{ED547CC8-0BFB-468B-B2A5-BA6D23975E31}" type="datetimeFigureOut">
               <a:rPr lang="en-US" smtClean="0"/>
-              <a:t>3/15/2018</a:t>
+              <a:t>3/16/2018</a:t>
             </a:fld>
             <a:endParaRPr lang="en-US"/>
           </a:p>
@@ -596,7 +597,7 @@
           <a:p>
             <a:fld id="{ED547CC8-0BFB-468B-B2A5-BA6D23975E31}" type="datetimeFigureOut">
               <a:rPr lang="en-US" smtClean="0"/>
-              <a:t>3/15/2018</a:t>
+              <a:t>3/16/2018</a:t>
             </a:fld>
             <a:endParaRPr lang="en-US"/>
           </a:p>
@@ -766,7 +767,7 @@
           <a:p>
             <a:fld id="{ED547CC8-0BFB-468B-B2A5-BA6D23975E31}" type="datetimeFigureOut">
               <a:rPr lang="en-US" smtClean="0"/>
-              <a:t>3/15/2018</a:t>
+              <a:t>3/16/2018</a:t>
             </a:fld>
             <a:endParaRPr lang="en-US"/>
           </a:p>
@@ -1012,7 +1013,7 @@
           <a:p>
             <a:fld id="{ED547CC8-0BFB-468B-B2A5-BA6D23975E31}" type="datetimeFigureOut">
               <a:rPr lang="en-US" smtClean="0"/>
-              <a:t>3/15/2018</a:t>
+              <a:t>3/16/2018</a:t>
             </a:fld>
             <a:endParaRPr lang="en-US"/>
           </a:p>
@@ -1244,7 +1245,7 @@
           <a:p>
             <a:fld id="{ED547CC8-0BFB-468B-B2A5-BA6D23975E31}" type="datetimeFigureOut">
               <a:rPr lang="en-US" smtClean="0"/>
-              <a:t>3/15/2018</a:t>
+              <a:t>3/16/2018</a:t>
             </a:fld>
             <a:endParaRPr lang="en-US"/>
           </a:p>
@@ -1611,7 +1612,7 @@
           <a:p>
             <a:fld id="{ED547CC8-0BFB-468B-B2A5-BA6D23975E31}" type="datetimeFigureOut">
               <a:rPr lang="en-US" smtClean="0"/>
-              <a:t>3/15/2018</a:t>
+              <a:t>3/16/2018</a:t>
             </a:fld>
             <a:endParaRPr lang="en-US"/>
           </a:p>
@@ -1729,7 +1730,7 @@
           <a:p>
             <a:fld id="{ED547CC8-0BFB-468B-B2A5-BA6D23975E31}" type="datetimeFigureOut">
               <a:rPr lang="en-US" smtClean="0"/>
-              <a:t>3/15/2018</a:t>
+              <a:t>3/16/2018</a:t>
             </a:fld>
             <a:endParaRPr lang="en-US"/>
           </a:p>
@@ -1824,7 +1825,7 @@
           <a:p>
             <a:fld id="{ED547CC8-0BFB-468B-B2A5-BA6D23975E31}" type="datetimeFigureOut">
               <a:rPr lang="en-US" smtClean="0"/>
-              <a:t>3/15/2018</a:t>
+              <a:t>3/16/2018</a:t>
             </a:fld>
             <a:endParaRPr lang="en-US"/>
           </a:p>
@@ -2101,7 +2102,7 @@
           <a:p>
             <a:fld id="{ED547CC8-0BFB-468B-B2A5-BA6D23975E31}" type="datetimeFigureOut">
               <a:rPr lang="en-US" smtClean="0"/>
-              <a:t>3/15/2018</a:t>
+              <a:t>3/16/2018</a:t>
             </a:fld>
             <a:endParaRPr lang="en-US"/>
           </a:p>
@@ -2354,7 +2355,7 @@
           <a:p>
             <a:fld id="{ED547CC8-0BFB-468B-B2A5-BA6D23975E31}" type="datetimeFigureOut">
               <a:rPr lang="en-US" smtClean="0"/>
-              <a:t>3/15/2018</a:t>
+              <a:t>3/16/2018</a:t>
             </a:fld>
             <a:endParaRPr lang="en-US"/>
           </a:p>
@@ -2567,7 +2568,7 @@
           <a:p>
             <a:fld id="{ED547CC8-0BFB-468B-B2A5-BA6D23975E31}" type="datetimeFigureOut">
               <a:rPr lang="en-US" smtClean="0"/>
-              <a:t>3/15/2018</a:t>
+              <a:t>3/16/2018</a:t>
             </a:fld>
             <a:endParaRPr lang="en-US"/>
           </a:p>
@@ -2974,6 +2975,366 @@
       </p:grpSpPr>
       <p:pic>
         <p:nvPicPr>
+          <p:cNvPr id="4" name="Picture 3"/>
+          <p:cNvPicPr>
+            <a:picLocks noChangeAspect="1"/>
+          </p:cNvPicPr>
+          <p:nvPr/>
+        </p:nvPicPr>
+        <p:blipFill>
+          <a:blip r:embed="rId2" cstate="print">
+            <a:extLst>
+              <a:ext uri="{28A0092B-C50C-407E-A947-70E740481C1C}">
+                <a14:useLocalDpi xmlns:a14="http://schemas.microsoft.com/office/drawing/2010/main" val="0"/>
+              </a:ext>
+            </a:extLst>
+          </a:blip>
+          <a:stretch>
+            <a:fillRect/>
+          </a:stretch>
+        </p:blipFill>
+        <p:spPr>
+          <a:xfrm>
+            <a:off x="291061" y="0"/>
+            <a:ext cx="11604451" cy="6854794"/>
+          </a:xfrm>
+          <a:prstGeom prst="rect">
+            <a:avLst/>
+          </a:prstGeom>
+        </p:spPr>
+      </p:pic>
+      <p:sp>
+        <p:nvSpPr>
+          <p:cNvPr id="5" name="TextBox 4"/>
+          <p:cNvSpPr txBox="1"/>
+          <p:nvPr/>
+        </p:nvSpPr>
+        <p:spPr>
+          <a:xfrm>
+            <a:off x="1346720" y="656706"/>
+            <a:ext cx="4746566" cy="369332"/>
+          </a:xfrm>
+          <a:prstGeom prst="rect">
+            <a:avLst/>
+          </a:prstGeom>
+          <a:noFill/>
+        </p:spPr>
+        <p:txBody>
+          <a:bodyPr wrap="square" rtlCol="0">
+            <a:spAutoFit/>
+          </a:bodyPr>
+          <a:lstStyle/>
+          <a:p>
+            <a:r>
+              <a:rPr lang="en-US" dirty="0" smtClean="0"/>
+              <a:t>Administrative Boundaries</a:t>
+            </a:r>
+            <a:endParaRPr lang="en-US" dirty="0"/>
+          </a:p>
+        </p:txBody>
+      </p:sp>
+      <p:sp>
+        <p:nvSpPr>
+          <p:cNvPr id="6" name="TextBox 5"/>
+          <p:cNvSpPr txBox="1"/>
+          <p:nvPr/>
+        </p:nvSpPr>
+        <p:spPr>
+          <a:xfrm>
+            <a:off x="1050174" y="1523017"/>
+            <a:ext cx="2698866" cy="646331"/>
+          </a:xfrm>
+          <a:prstGeom prst="rect">
+            <a:avLst/>
+          </a:prstGeom>
+          <a:noFill/>
+        </p:spPr>
+        <p:txBody>
+          <a:bodyPr wrap="square" rtlCol="0">
+            <a:spAutoFit/>
+          </a:bodyPr>
+          <a:lstStyle/>
+          <a:p>
+            <a:r>
+              <a:rPr lang="en-US" dirty="0" smtClean="0"/>
+              <a:t>Oracle Mapped Tables (emissions)</a:t>
+            </a:r>
+            <a:endParaRPr lang="en-US" dirty="0"/>
+          </a:p>
+        </p:txBody>
+      </p:sp>
+      <p:sp>
+        <p:nvSpPr>
+          <p:cNvPr id="7" name="TextBox 6"/>
+          <p:cNvSpPr txBox="1"/>
+          <p:nvPr/>
+        </p:nvSpPr>
+        <p:spPr>
+          <a:xfrm>
+            <a:off x="2383619" y="2281047"/>
+            <a:ext cx="2464827" cy="369332"/>
+          </a:xfrm>
+          <a:prstGeom prst="rect">
+            <a:avLst/>
+          </a:prstGeom>
+          <a:noFill/>
+        </p:spPr>
+        <p:txBody>
+          <a:bodyPr wrap="square" rtlCol="0">
+            <a:spAutoFit/>
+          </a:bodyPr>
+          <a:lstStyle/>
+          <a:p>
+            <a:r>
+              <a:rPr lang="en-US" dirty="0" smtClean="0"/>
+              <a:t>e-geos new burnt areas</a:t>
+            </a:r>
+            <a:endParaRPr lang="en-US" dirty="0"/>
+          </a:p>
+        </p:txBody>
+      </p:sp>
+      <p:sp>
+        <p:nvSpPr>
+          <p:cNvPr id="8" name="TextBox 7"/>
+          <p:cNvSpPr txBox="1"/>
+          <p:nvPr/>
+        </p:nvSpPr>
+        <p:spPr>
+          <a:xfrm>
+            <a:off x="7154573" y="2581414"/>
+            <a:ext cx="1379855" cy="369332"/>
+          </a:xfrm>
+          <a:prstGeom prst="rect">
+            <a:avLst/>
+          </a:prstGeom>
+          <a:noFill/>
+        </p:spPr>
+        <p:txBody>
+          <a:bodyPr wrap="square" rtlCol="0">
+            <a:spAutoFit/>
+          </a:bodyPr>
+          <a:lstStyle/>
+          <a:p>
+            <a:r>
+              <a:rPr lang="en-US" dirty="0" err="1" smtClean="0"/>
+              <a:t>Effis</a:t>
+            </a:r>
+            <a:r>
+              <a:rPr lang="en-US" dirty="0" smtClean="0"/>
+              <a:t> / </a:t>
+            </a:r>
+            <a:r>
+              <a:rPr lang="en-US" dirty="0" err="1" smtClean="0"/>
+              <a:t>Gwis</a:t>
+            </a:r>
+            <a:endParaRPr lang="en-US" dirty="0"/>
+          </a:p>
+        </p:txBody>
+      </p:sp>
+      <p:sp>
+        <p:nvSpPr>
+          <p:cNvPr id="9" name="TextBox 8"/>
+          <p:cNvSpPr txBox="1"/>
+          <p:nvPr/>
+        </p:nvSpPr>
+        <p:spPr>
+          <a:xfrm>
+            <a:off x="6392139" y="4001153"/>
+            <a:ext cx="1911841" cy="1200329"/>
+          </a:xfrm>
+          <a:prstGeom prst="rect">
+            <a:avLst/>
+          </a:prstGeom>
+          <a:noFill/>
+        </p:spPr>
+        <p:txBody>
+          <a:bodyPr wrap="square" rtlCol="0">
+            <a:spAutoFit/>
+          </a:bodyPr>
+          <a:lstStyle/>
+          <a:p>
+            <a:r>
+              <a:rPr lang="en-US" dirty="0" smtClean="0"/>
+              <a:t>Modeled Emissions and Dispersion (Bruno)</a:t>
+            </a:r>
+            <a:endParaRPr lang="en-US" dirty="0"/>
+          </a:p>
+        </p:txBody>
+      </p:sp>
+      <p:sp>
+        <p:nvSpPr>
+          <p:cNvPr id="10" name="TextBox 9"/>
+          <p:cNvSpPr txBox="1"/>
+          <p:nvPr/>
+        </p:nvSpPr>
+        <p:spPr>
+          <a:xfrm>
+            <a:off x="9717579" y="1090754"/>
+            <a:ext cx="2238894" cy="646331"/>
+          </a:xfrm>
+          <a:prstGeom prst="rect">
+            <a:avLst/>
+          </a:prstGeom>
+          <a:noFill/>
+        </p:spPr>
+        <p:txBody>
+          <a:bodyPr wrap="square" rtlCol="0">
+            <a:spAutoFit/>
+          </a:bodyPr>
+          <a:lstStyle/>
+          <a:p>
+            <a:r>
+              <a:rPr lang="en-US" dirty="0" smtClean="0"/>
+              <a:t>Land Cover </a:t>
+            </a:r>
+          </a:p>
+          <a:p>
+            <a:r>
+              <a:rPr lang="en-US" dirty="0" err="1" smtClean="0"/>
+              <a:t>GlobCover</a:t>
+            </a:r>
+            <a:r>
+              <a:rPr lang="en-US" dirty="0" smtClean="0"/>
+              <a:t> and </a:t>
+            </a:r>
+            <a:r>
+              <a:rPr lang="en-US" dirty="0" err="1" smtClean="0"/>
+              <a:t>Corine</a:t>
+            </a:r>
+            <a:endParaRPr lang="en-US" dirty="0"/>
+          </a:p>
+        </p:txBody>
+      </p:sp>
+      <p:sp>
+        <p:nvSpPr>
+          <p:cNvPr id="11" name="TextBox 10"/>
+          <p:cNvSpPr txBox="1"/>
+          <p:nvPr/>
+        </p:nvSpPr>
+        <p:spPr>
+          <a:xfrm>
+            <a:off x="10133097" y="3649608"/>
+            <a:ext cx="1911841" cy="646331"/>
+          </a:xfrm>
+          <a:prstGeom prst="rect">
+            <a:avLst/>
+          </a:prstGeom>
+          <a:noFill/>
+        </p:spPr>
+        <p:txBody>
+          <a:bodyPr wrap="square" rtlCol="0">
+            <a:spAutoFit/>
+          </a:bodyPr>
+          <a:lstStyle/>
+          <a:p>
+            <a:r>
+              <a:rPr lang="en-US" dirty="0" smtClean="0"/>
+              <a:t>Unfiltered FIRMS hotspots global</a:t>
+            </a:r>
+            <a:endParaRPr lang="en-US" dirty="0"/>
+          </a:p>
+        </p:txBody>
+      </p:sp>
+      <p:sp>
+        <p:nvSpPr>
+          <p:cNvPr id="12" name="TextBox 11"/>
+          <p:cNvSpPr txBox="1"/>
+          <p:nvPr/>
+        </p:nvSpPr>
+        <p:spPr>
+          <a:xfrm>
+            <a:off x="2696448" y="6133787"/>
+            <a:ext cx="2698866" cy="646331"/>
+          </a:xfrm>
+          <a:prstGeom prst="rect">
+            <a:avLst/>
+          </a:prstGeom>
+          <a:noFill/>
+        </p:spPr>
+        <p:txBody>
+          <a:bodyPr wrap="square" rtlCol="0">
+            <a:spAutoFit/>
+          </a:bodyPr>
+          <a:lstStyle/>
+          <a:p>
+            <a:r>
+              <a:rPr lang="en-US" dirty="0" smtClean="0"/>
+              <a:t>Oracle Mapped Tables (current </a:t>
+            </a:r>
+            <a:r>
+              <a:rPr lang="en-US" dirty="0" err="1" smtClean="0"/>
+              <a:t>ba</a:t>
+            </a:r>
+            <a:r>
+              <a:rPr lang="en-US" dirty="0" smtClean="0"/>
+              <a:t> and evolution)</a:t>
+            </a:r>
+            <a:endParaRPr lang="en-US" dirty="0"/>
+          </a:p>
+        </p:txBody>
+      </p:sp>
+      <p:sp>
+        <p:nvSpPr>
+          <p:cNvPr id="13" name="TextBox 12"/>
+          <p:cNvSpPr txBox="1"/>
+          <p:nvPr/>
+        </p:nvSpPr>
+        <p:spPr>
+          <a:xfrm>
+            <a:off x="3089960" y="3834274"/>
+            <a:ext cx="1911841" cy="923330"/>
+          </a:xfrm>
+          <a:prstGeom prst="rect">
+            <a:avLst/>
+          </a:prstGeom>
+          <a:noFill/>
+        </p:spPr>
+        <p:txBody>
+          <a:bodyPr wrap="square" rtlCol="0">
+            <a:spAutoFit/>
+          </a:bodyPr>
+          <a:lstStyle/>
+          <a:p>
+            <a:r>
+              <a:rPr lang="en-US" dirty="0" smtClean="0"/>
+              <a:t>Final and active burnt areas (Tomas)</a:t>
+            </a:r>
+            <a:endParaRPr lang="en-US" dirty="0"/>
+          </a:p>
+        </p:txBody>
+      </p:sp>
+    </p:spTree>
+    <p:extLst>
+      <p:ext uri="{BB962C8B-B14F-4D97-AF65-F5344CB8AC3E}">
+        <p14:creationId xmlns:p14="http://schemas.microsoft.com/office/powerpoint/2010/main" val="1859772104"/>
+      </p:ext>
+    </p:extLst>
+  </p:cSld>
+  <p:clrMapOvr>
+    <a:masterClrMapping/>
+  </p:clrMapOvr>
+</p:sld>
+</file>
+
+<file path=ppt/slides/slide2.xml><?xml version="1.0" encoding="utf-8"?>
+<p:sld xmlns:a="http://schemas.openxmlformats.org/drawingml/2006/main" xmlns:r="http://schemas.openxmlformats.org/officeDocument/2006/relationships" xmlns:p="http://schemas.openxmlformats.org/presentationml/2006/main">
+  <p:cSld>
+    <p:spTree>
+      <p:nvGrpSpPr>
+        <p:cNvPr id="1" name=""/>
+        <p:cNvGrpSpPr/>
+        <p:nvPr/>
+      </p:nvGrpSpPr>
+      <p:grpSpPr>
+        <a:xfrm>
+          <a:off x="0" y="0"/>
+          <a:ext cx="0" cy="0"/>
+          <a:chOff x="0" y="0"/>
+          <a:chExt cx="0" cy="0"/>
+        </a:xfrm>
+      </p:grpSpPr>
+      <p:pic>
+        <p:nvPicPr>
           <p:cNvPr id="5" name="Picture 4"/>
           <p:cNvPicPr>
             <a:picLocks noChangeAspect="1"/>
@@ -3015,7 +3376,7 @@
 </p:sld>
 </file>
 
-<file path=ppt/slides/slide2.xml><?xml version="1.0" encoding="utf-8"?>
+<file path=ppt/slides/slide3.xml><?xml version="1.0" encoding="utf-8"?>
 <p:sld xmlns:a="http://schemas.openxmlformats.org/drawingml/2006/main" xmlns:r="http://schemas.openxmlformats.org/officeDocument/2006/relationships" xmlns:p="http://schemas.openxmlformats.org/presentationml/2006/main">
   <p:cSld>
     <p:spTree>
@@ -3075,7 +3436,7 @@
 </p:sld>
 </file>
 
-<file path=ppt/slides/slide3.xml><?xml version="1.0" encoding="utf-8"?>
+<file path=ppt/slides/slide4.xml><?xml version="1.0" encoding="utf-8"?>
 <p:sld xmlns:a="http://schemas.openxmlformats.org/drawingml/2006/main" xmlns:r="http://schemas.openxmlformats.org/officeDocument/2006/relationships" xmlns:p="http://schemas.openxmlformats.org/presentationml/2006/main">
   <p:cSld>
     <p:spTree>
@@ -3135,7 +3496,7 @@
 </p:sld>
 </file>
 
-<file path=ppt/slides/slide4.xml><?xml version="1.0" encoding="utf-8"?>
+<file path=ppt/slides/slide5.xml><?xml version="1.0" encoding="utf-8"?>
 <p:sld xmlns:a="http://schemas.openxmlformats.org/drawingml/2006/main" xmlns:r="http://schemas.openxmlformats.org/officeDocument/2006/relationships" xmlns:p="http://schemas.openxmlformats.org/presentationml/2006/main">
   <p:cSld>
     <p:spTree>

</xml_diff>